<commit_message>
Ready for Final Presentation
All Code Files and Presentation Files are Ready for the Final
</commit_message>
<xml_diff>
--- a/SERTS AFP Final Presentation.pptx
+++ b/SERTS AFP Final Presentation.pptx
@@ -8,9 +8,10 @@
     <p:sldId id="256" r:id="rId2"/>
     <p:sldId id="257" r:id="rId3"/>
     <p:sldId id="258" r:id="rId4"/>
-    <p:sldId id="259" r:id="rId5"/>
-    <p:sldId id="261" r:id="rId6"/>
-    <p:sldId id="260" r:id="rId7"/>
+    <p:sldId id="262" r:id="rId5"/>
+    <p:sldId id="259" r:id="rId6"/>
+    <p:sldId id="261" r:id="rId7"/>
+    <p:sldId id="260" r:id="rId8"/>
   </p:sldIdLst>
   <p:sldSz cx="12192000" cy="6858000"/>
   <p:notesSz cx="6858000" cy="9144000"/>
@@ -109,6 +110,11 @@
       </a:defRPr>
     </a:lvl9pPr>
   </p:defaultTextStyle>
+  <p:extLst>
+    <p:ext uri="{EFAFB233-063F-42B5-8137-9DF3F51BA10A}">
+      <p15:sldGuideLst xmlns:p15="http://schemas.microsoft.com/office/powerpoint/2012/main"/>
+    </p:ext>
+  </p:extLst>
 </p:presentation>
 </file>
 
@@ -6285,41 +6291,43 @@
         </p:nvSpPr>
         <p:spPr/>
         <p:txBody>
-          <a:bodyPr/>
+          <a:bodyPr>
+            <a:normAutofit fontScale="92500" lnSpcReduction="10000"/>
+          </a:bodyPr>
           <a:lstStyle/>
           <a:p>
             <a:r>
-              <a:rPr lang="en-US" dirty="0"/>
+              <a:rPr lang="en-US" sz="2800" dirty="0"/>
               <a:t>Select a specific song</a:t>
             </a:r>
           </a:p>
           <a:p>
             <a:r>
-              <a:rPr lang="en-US" dirty="0"/>
+              <a:rPr lang="en-US" sz="2800" dirty="0"/>
               <a:t>Play the selected song</a:t>
             </a:r>
           </a:p>
           <a:p>
             <a:r>
-              <a:rPr lang="en-US" dirty="0"/>
+              <a:rPr lang="en-US" sz="2800" dirty="0"/>
               <a:t>Pause the selected song</a:t>
             </a:r>
           </a:p>
           <a:p>
             <a:r>
-              <a:rPr lang="en-US" dirty="0"/>
+              <a:rPr lang="en-US" sz="2800" dirty="0"/>
               <a:t>Resume the selected song</a:t>
             </a:r>
           </a:p>
           <a:p>
             <a:r>
-              <a:rPr lang="en-US" dirty="0"/>
+              <a:rPr lang="en-US" sz="2800" dirty="0"/>
               <a:t>Go to the next song</a:t>
             </a:r>
           </a:p>
           <a:p>
             <a:r>
-              <a:rPr lang="en-US" dirty="0"/>
+              <a:rPr lang="en-US" sz="2800" dirty="0"/>
               <a:t>Go to the previous song</a:t>
             </a:r>
           </a:p>
@@ -6371,7 +6379,12 @@
             <p:ph type="title"/>
           </p:nvPr>
         </p:nvSpPr>
-        <p:spPr/>
+        <p:spPr>
+          <a:xfrm>
+            <a:off x="1086643" y="184730"/>
+            <a:ext cx="10018713" cy="1200726"/>
+          </a:xfrm>
+        </p:spPr>
         <p:txBody>
           <a:bodyPr/>
           <a:lstStyle/>
@@ -6383,31 +6396,36 @@
           </a:p>
         </p:txBody>
       </p:sp>
-      <p:sp>
-        <p:nvSpPr>
-          <p:cNvPr id="3" name="Content Placeholder 2">
+      <p:pic>
+        <p:nvPicPr>
+          <p:cNvPr id="4" name="Picture 3">
             <a:extLst>
               <a:ext uri="{FF2B5EF4-FFF2-40B4-BE49-F238E27FC236}">
-                <a16:creationId xmlns:a16="http://schemas.microsoft.com/office/drawing/2014/main" id="{3E7E2DD8-38BF-41E9-BF13-C3DED0362A80}"/>
+                <a16:creationId xmlns:a16="http://schemas.microsoft.com/office/drawing/2014/main" id="{E7B9979B-DA28-426C-A829-47874E2611F0}"/>
               </a:ext>
             </a:extLst>
           </p:cNvPr>
-          <p:cNvSpPr>
-            <a:spLocks noGrp="1"/>
-          </p:cNvSpPr>
-          <p:nvPr>
-            <p:ph idx="1"/>
-          </p:nvPr>
-        </p:nvSpPr>
-        <p:spPr/>
-        <p:txBody>
-          <a:bodyPr/>
-          <a:lstStyle/>
-          <a:p>
-            <a:endParaRPr lang="en-US"/>
-          </a:p>
-        </p:txBody>
-      </p:sp>
+          <p:cNvPicPr>
+            <a:picLocks noChangeAspect="1"/>
+          </p:cNvPicPr>
+          <p:nvPr/>
+        </p:nvPicPr>
+        <p:blipFill>
+          <a:blip r:embed="rId2"/>
+          <a:stretch>
+            <a:fillRect/>
+          </a:stretch>
+        </p:blipFill>
+        <p:spPr>
+          <a:xfrm>
+            <a:off x="2623127" y="1725856"/>
+            <a:ext cx="6945746" cy="4767776"/>
+          </a:xfrm>
+          <a:prstGeom prst="rect">
+            <a:avLst/>
+          </a:prstGeom>
+        </p:spPr>
+      </p:pic>
     </p:spTree>
     <p:extLst>
       <p:ext uri="{BB962C8B-B14F-4D97-AF65-F5344CB8AC3E}">
@@ -6422,6 +6440,99 @@
 </file>
 
 <file path=ppt/slides/slide4.xml><?xml version="1.0" encoding="utf-8"?>
+<p:sld xmlns:a="http://schemas.openxmlformats.org/drawingml/2006/main" xmlns:r="http://schemas.openxmlformats.org/officeDocument/2006/relationships" xmlns:p="http://schemas.openxmlformats.org/presentationml/2006/main">
+  <p:cSld>
+    <p:spTree>
+      <p:nvGrpSpPr>
+        <p:cNvPr id="1" name=""/>
+        <p:cNvGrpSpPr/>
+        <p:nvPr/>
+      </p:nvGrpSpPr>
+      <p:grpSpPr>
+        <a:xfrm>
+          <a:off x="0" y="0"/>
+          <a:ext cx="0" cy="0"/>
+          <a:chOff x="0" y="0"/>
+          <a:chExt cx="0" cy="0"/>
+        </a:xfrm>
+      </p:grpSpPr>
+      <p:sp>
+        <p:nvSpPr>
+          <p:cNvPr id="2" name="Title 1">
+            <a:extLst>
+              <a:ext uri="{FF2B5EF4-FFF2-40B4-BE49-F238E27FC236}">
+                <a16:creationId xmlns:a16="http://schemas.microsoft.com/office/drawing/2014/main" id="{5D9696F2-7019-47BE-BABE-2668613993A9}"/>
+              </a:ext>
+            </a:extLst>
+          </p:cNvPr>
+          <p:cNvSpPr>
+            <a:spLocks noGrp="1"/>
+          </p:cNvSpPr>
+          <p:nvPr>
+            <p:ph type="title"/>
+          </p:nvPr>
+        </p:nvSpPr>
+        <p:spPr>
+          <a:xfrm>
+            <a:off x="1086643" y="270167"/>
+            <a:ext cx="10018713" cy="1752599"/>
+          </a:xfrm>
+        </p:spPr>
+        <p:txBody>
+          <a:bodyPr/>
+          <a:lstStyle/>
+          <a:p>
+            <a:r>
+              <a:rPr lang="en-US" dirty="0"/>
+              <a:t>Software System Context Diagram</a:t>
+            </a:r>
+          </a:p>
+        </p:txBody>
+      </p:sp>
+      <p:pic>
+        <p:nvPicPr>
+          <p:cNvPr id="4" name="Picture 3">
+            <a:extLst>
+              <a:ext uri="{FF2B5EF4-FFF2-40B4-BE49-F238E27FC236}">
+                <a16:creationId xmlns:a16="http://schemas.microsoft.com/office/drawing/2014/main" id="{73D637AD-FA93-403F-9761-FB66C520EBA9}"/>
+              </a:ext>
+            </a:extLst>
+          </p:cNvPr>
+          <p:cNvPicPr>
+            <a:picLocks noChangeAspect="1"/>
+          </p:cNvPicPr>
+          <p:nvPr/>
+        </p:nvPicPr>
+        <p:blipFill>
+          <a:blip r:embed="rId2"/>
+          <a:stretch>
+            <a:fillRect/>
+          </a:stretch>
+        </p:blipFill>
+        <p:spPr>
+          <a:xfrm>
+            <a:off x="414013" y="2262910"/>
+            <a:ext cx="11363974" cy="3532906"/>
+          </a:xfrm>
+          <a:prstGeom prst="rect">
+            <a:avLst/>
+          </a:prstGeom>
+        </p:spPr>
+      </p:pic>
+    </p:spTree>
+    <p:extLst>
+      <p:ext uri="{BB962C8B-B14F-4D97-AF65-F5344CB8AC3E}">
+        <p14:creationId xmlns:p14="http://schemas.microsoft.com/office/powerpoint/2010/main" val="1892978746"/>
+      </p:ext>
+    </p:extLst>
+  </p:cSld>
+  <p:clrMapOvr>
+    <a:masterClrMapping/>
+  </p:clrMapOvr>
+</p:sld>
+</file>
+
+<file path=ppt/slides/slide5.xml><?xml version="1.0" encoding="utf-8"?>
 <p:sld xmlns:a="http://schemas.openxmlformats.org/drawingml/2006/main" xmlns:r="http://schemas.openxmlformats.org/officeDocument/2006/relationships" xmlns:p="http://schemas.openxmlformats.org/presentationml/2006/main">
   <p:cSld>
     <p:spTree>
@@ -6539,89 +6650,6 @@
 </p:sld>
 </file>
 
-<file path=ppt/slides/slide5.xml><?xml version="1.0" encoding="utf-8"?>
-<p:sld xmlns:a="http://schemas.openxmlformats.org/drawingml/2006/main" xmlns:r="http://schemas.openxmlformats.org/officeDocument/2006/relationships" xmlns:p="http://schemas.openxmlformats.org/presentationml/2006/main">
-  <p:cSld>
-    <p:spTree>
-      <p:nvGrpSpPr>
-        <p:cNvPr id="1" name=""/>
-        <p:cNvGrpSpPr/>
-        <p:nvPr/>
-      </p:nvGrpSpPr>
-      <p:grpSpPr>
-        <a:xfrm>
-          <a:off x="0" y="0"/>
-          <a:ext cx="0" cy="0"/>
-          <a:chOff x="0" y="0"/>
-          <a:chExt cx="0" cy="0"/>
-        </a:xfrm>
-      </p:grpSpPr>
-      <p:sp>
-        <p:nvSpPr>
-          <p:cNvPr id="2" name="Title 1">
-            <a:extLst>
-              <a:ext uri="{FF2B5EF4-FFF2-40B4-BE49-F238E27FC236}">
-                <a16:creationId xmlns:a16="http://schemas.microsoft.com/office/drawing/2014/main" id="{9ACEA6E4-63D6-4A56-B77E-B3A967C84F5F}"/>
-              </a:ext>
-            </a:extLst>
-          </p:cNvPr>
-          <p:cNvSpPr>
-            <a:spLocks noGrp="1"/>
-          </p:cNvSpPr>
-          <p:nvPr>
-            <p:ph type="title"/>
-          </p:nvPr>
-        </p:nvSpPr>
-        <p:spPr/>
-        <p:txBody>
-          <a:bodyPr/>
-          <a:lstStyle/>
-          <a:p>
-            <a:r>
-              <a:rPr lang="en-US" dirty="0"/>
-              <a:t>AFP GUI</a:t>
-            </a:r>
-          </a:p>
-        </p:txBody>
-      </p:sp>
-      <p:sp>
-        <p:nvSpPr>
-          <p:cNvPr id="3" name="Content Placeholder 2">
-            <a:extLst>
-              <a:ext uri="{FF2B5EF4-FFF2-40B4-BE49-F238E27FC236}">
-                <a16:creationId xmlns:a16="http://schemas.microsoft.com/office/drawing/2014/main" id="{C2A5F373-DB0E-4078-8804-2E104CE55CF1}"/>
-              </a:ext>
-            </a:extLst>
-          </p:cNvPr>
-          <p:cNvSpPr>
-            <a:spLocks noGrp="1"/>
-          </p:cNvSpPr>
-          <p:nvPr>
-            <p:ph idx="1"/>
-          </p:nvPr>
-        </p:nvSpPr>
-        <p:spPr/>
-        <p:txBody>
-          <a:bodyPr/>
-          <a:lstStyle/>
-          <a:p>
-            <a:endParaRPr lang="en-US"/>
-          </a:p>
-        </p:txBody>
-      </p:sp>
-    </p:spTree>
-    <p:extLst>
-      <p:ext uri="{BB962C8B-B14F-4D97-AF65-F5344CB8AC3E}">
-        <p14:creationId xmlns:p14="http://schemas.microsoft.com/office/powerpoint/2010/main" val="2411907680"/>
-      </p:ext>
-    </p:extLst>
-  </p:cSld>
-  <p:clrMapOvr>
-    <a:masterClrMapping/>
-  </p:clrMapOvr>
-</p:sld>
-</file>
-
 <file path=ppt/slides/slide6.xml><?xml version="1.0" encoding="utf-8"?>
 <p:sld xmlns:a="http://schemas.openxmlformats.org/drawingml/2006/main" xmlns:r="http://schemas.openxmlformats.org/officeDocument/2006/relationships" xmlns:p="http://schemas.openxmlformats.org/presentationml/2006/main">
   <p:cSld>
@@ -6644,6 +6672,99 @@
           <p:cNvPr id="2" name="Title 1">
             <a:extLst>
               <a:ext uri="{FF2B5EF4-FFF2-40B4-BE49-F238E27FC236}">
+                <a16:creationId xmlns:a16="http://schemas.microsoft.com/office/drawing/2014/main" id="{9ACEA6E4-63D6-4A56-B77E-B3A967C84F5F}"/>
+              </a:ext>
+            </a:extLst>
+          </p:cNvPr>
+          <p:cNvSpPr>
+            <a:spLocks noGrp="1"/>
+          </p:cNvSpPr>
+          <p:nvPr>
+            <p:ph type="title"/>
+          </p:nvPr>
+        </p:nvSpPr>
+        <p:spPr>
+          <a:xfrm>
+            <a:off x="1484311" y="122379"/>
+            <a:ext cx="10018713" cy="1752599"/>
+          </a:xfrm>
+        </p:spPr>
+        <p:txBody>
+          <a:bodyPr/>
+          <a:lstStyle/>
+          <a:p>
+            <a:r>
+              <a:rPr lang="en-US" dirty="0"/>
+              <a:t>AFP GUI</a:t>
+            </a:r>
+          </a:p>
+        </p:txBody>
+      </p:sp>
+      <p:pic>
+        <p:nvPicPr>
+          <p:cNvPr id="4" name="Picture 3">
+            <a:extLst>
+              <a:ext uri="{FF2B5EF4-FFF2-40B4-BE49-F238E27FC236}">
+                <a16:creationId xmlns:a16="http://schemas.microsoft.com/office/drawing/2014/main" id="{08975D86-7ECA-495F-9C4E-FCADBF23DE11}"/>
+              </a:ext>
+            </a:extLst>
+          </p:cNvPr>
+          <p:cNvPicPr>
+            <a:picLocks noChangeAspect="1"/>
+          </p:cNvPicPr>
+          <p:nvPr/>
+        </p:nvPicPr>
+        <p:blipFill>
+          <a:blip r:embed="rId2"/>
+          <a:stretch>
+            <a:fillRect/>
+          </a:stretch>
+        </p:blipFill>
+        <p:spPr>
+          <a:xfrm>
+            <a:off x="3288647" y="1425660"/>
+            <a:ext cx="6410038" cy="5323816"/>
+          </a:xfrm>
+          <a:prstGeom prst="rect">
+            <a:avLst/>
+          </a:prstGeom>
+        </p:spPr>
+      </p:pic>
+    </p:spTree>
+    <p:extLst>
+      <p:ext uri="{BB962C8B-B14F-4D97-AF65-F5344CB8AC3E}">
+        <p14:creationId xmlns:p14="http://schemas.microsoft.com/office/powerpoint/2010/main" val="2411907680"/>
+      </p:ext>
+    </p:extLst>
+  </p:cSld>
+  <p:clrMapOvr>
+    <a:masterClrMapping/>
+  </p:clrMapOvr>
+</p:sld>
+</file>
+
+<file path=ppt/slides/slide7.xml><?xml version="1.0" encoding="utf-8"?>
+<p:sld xmlns:a="http://schemas.openxmlformats.org/drawingml/2006/main" xmlns:r="http://schemas.openxmlformats.org/officeDocument/2006/relationships" xmlns:p="http://schemas.openxmlformats.org/presentationml/2006/main">
+  <p:cSld>
+    <p:spTree>
+      <p:nvGrpSpPr>
+        <p:cNvPr id="1" name=""/>
+        <p:cNvGrpSpPr/>
+        <p:nvPr/>
+      </p:nvGrpSpPr>
+      <p:grpSpPr>
+        <a:xfrm>
+          <a:off x="0" y="0"/>
+          <a:ext cx="0" cy="0"/>
+          <a:chOff x="0" y="0"/>
+          <a:chExt cx="0" cy="0"/>
+        </a:xfrm>
+      </p:grpSpPr>
+      <p:sp>
+        <p:nvSpPr>
+          <p:cNvPr id="2" name="Title 1">
+            <a:extLst>
+              <a:ext uri="{FF2B5EF4-FFF2-40B4-BE49-F238E27FC236}">
                 <a16:creationId xmlns:a16="http://schemas.microsoft.com/office/drawing/2014/main" id="{8CAFEA00-4996-41A1-9EB7-2A7D84B292EA}"/>
               </a:ext>
             </a:extLst>
@@ -6655,40 +6776,22 @@
             <p:ph type="title"/>
           </p:nvPr>
         </p:nvSpPr>
-        <p:spPr/>
-        <p:txBody>
-          <a:bodyPr/>
+        <p:spPr>
+          <a:xfrm>
+            <a:off x="1484311" y="2302167"/>
+            <a:ext cx="10018713" cy="1752599"/>
+          </a:xfrm>
+        </p:spPr>
+        <p:txBody>
+          <a:bodyPr>
+            <a:normAutofit/>
+          </a:bodyPr>
           <a:lstStyle/>
           <a:p>
             <a:r>
-              <a:rPr lang="en-US" dirty="0"/>
+              <a:rPr lang="en-US" sz="5400" b="1" dirty="0"/>
               <a:t>Demo!</a:t>
             </a:r>
-          </a:p>
-        </p:txBody>
-      </p:sp>
-      <p:sp>
-        <p:nvSpPr>
-          <p:cNvPr id="3" name="Content Placeholder 2">
-            <a:extLst>
-              <a:ext uri="{FF2B5EF4-FFF2-40B4-BE49-F238E27FC236}">
-                <a16:creationId xmlns:a16="http://schemas.microsoft.com/office/drawing/2014/main" id="{E6C9E693-8994-4240-ADD6-4012CCB0B743}"/>
-              </a:ext>
-            </a:extLst>
-          </p:cNvPr>
-          <p:cNvSpPr>
-            <a:spLocks noGrp="1"/>
-          </p:cNvSpPr>
-          <p:nvPr>
-            <p:ph idx="1"/>
-          </p:nvPr>
-        </p:nvSpPr>
-        <p:spPr/>
-        <p:txBody>
-          <a:bodyPr/>
-          <a:lstStyle/>
-          <a:p>
-            <a:endParaRPr lang="en-US"/>
           </a:p>
         </p:txBody>
       </p:sp>

</xml_diff>